<commit_message>
changed some things in the powerpoint
</commit_message>
<xml_diff>
--- a/Final Project Poster Template.draft.pptx
+++ b/Final Project Poster Template.draft.pptx
@@ -293,7 +293,7 @@
           <a:p>
             <a:fld id="{FC702967-EB2C-4717-9E17-BC16B9A1EF6A}" type="datetimeFigureOut">
               <a:rPr lang="en-US" smtClean="0"/>
-              <a:t>4/21/2023</a:t>
+              <a:t>4/25/2023</a:t>
             </a:fld>
             <a:endParaRPr lang="en-US"/>
           </a:p>
@@ -823,7 +823,7 @@
           <a:p>
             <a:fld id="{0E872153-8F8D-40E9-B7DF-307C37E3945F}" type="datetimeFigureOut">
               <a:rPr lang="en-US" smtClean="0"/>
-              <a:t>4/21/2023</a:t>
+              <a:t>4/25/2023</a:t>
             </a:fld>
             <a:endParaRPr lang="en-US"/>
           </a:p>
@@ -991,7 +991,7 @@
           <a:p>
             <a:fld id="{0E872153-8F8D-40E9-B7DF-307C37E3945F}" type="datetimeFigureOut">
               <a:rPr lang="en-US" smtClean="0"/>
-              <a:t>4/21/2023</a:t>
+              <a:t>4/25/2023</a:t>
             </a:fld>
             <a:endParaRPr lang="en-US"/>
           </a:p>
@@ -1169,7 +1169,7 @@
           <a:p>
             <a:fld id="{0E872153-8F8D-40E9-B7DF-307C37E3945F}" type="datetimeFigureOut">
               <a:rPr lang="en-US" smtClean="0"/>
-              <a:t>4/21/2023</a:t>
+              <a:t>4/25/2023</a:t>
             </a:fld>
             <a:endParaRPr lang="en-US"/>
           </a:p>
@@ -1337,7 +1337,7 @@
           <a:p>
             <a:fld id="{0E872153-8F8D-40E9-B7DF-307C37E3945F}" type="datetimeFigureOut">
               <a:rPr lang="en-US" smtClean="0"/>
-              <a:t>4/21/2023</a:t>
+              <a:t>4/25/2023</a:t>
             </a:fld>
             <a:endParaRPr lang="en-US"/>
           </a:p>
@@ -1582,7 +1582,7 @@
           <a:p>
             <a:fld id="{0E872153-8F8D-40E9-B7DF-307C37E3945F}" type="datetimeFigureOut">
               <a:rPr lang="en-US" smtClean="0"/>
-              <a:t>4/21/2023</a:t>
+              <a:t>4/25/2023</a:t>
             </a:fld>
             <a:endParaRPr lang="en-US"/>
           </a:p>
@@ -1867,7 +1867,7 @@
           <a:p>
             <a:fld id="{0E872153-8F8D-40E9-B7DF-307C37E3945F}" type="datetimeFigureOut">
               <a:rPr lang="en-US" smtClean="0"/>
-              <a:t>4/21/2023</a:t>
+              <a:t>4/25/2023</a:t>
             </a:fld>
             <a:endParaRPr lang="en-US"/>
           </a:p>
@@ -2291,7 +2291,7 @@
           <a:p>
             <a:fld id="{0E872153-8F8D-40E9-B7DF-307C37E3945F}" type="datetimeFigureOut">
               <a:rPr lang="en-US" smtClean="0"/>
-              <a:t>4/21/2023</a:t>
+              <a:t>4/25/2023</a:t>
             </a:fld>
             <a:endParaRPr lang="en-US"/>
           </a:p>
@@ -2408,7 +2408,7 @@
           <a:p>
             <a:fld id="{0E872153-8F8D-40E9-B7DF-307C37E3945F}" type="datetimeFigureOut">
               <a:rPr lang="en-US" smtClean="0"/>
-              <a:t>4/21/2023</a:t>
+              <a:t>4/25/2023</a:t>
             </a:fld>
             <a:endParaRPr lang="en-US"/>
           </a:p>
@@ -2503,7 +2503,7 @@
           <a:p>
             <a:fld id="{0E872153-8F8D-40E9-B7DF-307C37E3945F}" type="datetimeFigureOut">
               <a:rPr lang="en-US" smtClean="0"/>
-              <a:t>4/21/2023</a:t>
+              <a:t>4/25/2023</a:t>
             </a:fld>
             <a:endParaRPr lang="en-US"/>
           </a:p>
@@ -2778,7 +2778,7 @@
           <a:p>
             <a:fld id="{0E872153-8F8D-40E9-B7DF-307C37E3945F}" type="datetimeFigureOut">
               <a:rPr lang="en-US" smtClean="0"/>
-              <a:t>4/21/2023</a:t>
+              <a:t>4/25/2023</a:t>
             </a:fld>
             <a:endParaRPr lang="en-US"/>
           </a:p>
@@ -3030,7 +3030,7 @@
           <a:p>
             <a:fld id="{0E872153-8F8D-40E9-B7DF-307C37E3945F}" type="datetimeFigureOut">
               <a:rPr lang="en-US" smtClean="0"/>
-              <a:t>4/21/2023</a:t>
+              <a:t>4/25/2023</a:t>
             </a:fld>
             <a:endParaRPr lang="en-US"/>
           </a:p>
@@ -3241,7 +3241,7 @@
           <a:p>
             <a:fld id="{0E872153-8F8D-40E9-B7DF-307C37E3945F}" type="datetimeFigureOut">
               <a:rPr lang="en-US" smtClean="0"/>
-              <a:t>4/21/2023</a:t>
+              <a:t>4/25/2023</a:t>
             </a:fld>
             <a:endParaRPr lang="en-US"/>
           </a:p>
@@ -3844,16 +3844,16 @@
                 </a:solidFill>
                 <a:cs typeface="Arial" panose="020B0604020202020204" pitchFamily="34" charset="0"/>
               </a:rPr>
-              <a:t>Cortland </a:t>
-            </a:r>
-            <a:r>
-              <a:rPr lang="en-US" altLang="en-US" sz="4400" b="1" dirty="0" err="1">
+              <a:t>TEAM </a:t>
+            </a:r>
+            <a:r>
+              <a:rPr lang="en-US" altLang="en-US" sz="4400" b="1">
                 <a:solidFill>
                   <a:srgbClr val="FFC000"/>
                 </a:solidFill>
                 <a:cs typeface="Arial" panose="020B0604020202020204" pitchFamily="34" charset="0"/>
               </a:rPr>
-              <a:t>Diehm</a:t>
+              <a:t>MEMBERS: Cortland </a:t>
             </a:r>
             <a:r>
               <a:rPr lang="en-US" altLang="en-US" sz="4400" b="1" dirty="0">
@@ -3862,7 +3862,7 @@
                 </a:solidFill>
                 <a:cs typeface="Arial" panose="020B0604020202020204" pitchFamily="34" charset="0"/>
               </a:rPr>
-              <a:t>, Steven </a:t>
+              <a:t>Diehm, Steven </a:t>
             </a:r>
             <a:r>
               <a:rPr lang="en-US" altLang="en-US" sz="4400" b="1" dirty="0" err="1">
@@ -4510,21 +4510,21 @@
                 <a:latin typeface="+mj-lt"/>
                 <a:cs typeface="Arial" panose="020B0604020202020204" pitchFamily="34" charset="0"/>
               </a:rPr>
-              <a:t>The system technology includes a website. JavaScript was used to contain and interpret the API.  HTML will be used to frame the webpage and a bootstrap CSS embedded in HTML to alter the style of the webpage. There are functions and to better layout the website with JavaScript. </a:t>
+              <a:t>The system technology includes a website. JavaScript was used to contain and interpret the API.  HTML was used to frame the webpage and a CSS file linked in the HTML was written to alter the style of the webpage. </a:t>
             </a:r>
             <a:r>
               <a:rPr lang="en-US" altLang="en-US" sz="3600" dirty="0" err="1">
                 <a:latin typeface="+mj-lt"/>
                 <a:cs typeface="Arial" panose="020B0604020202020204" pitchFamily="34" charset="0"/>
               </a:rPr>
-              <a:t>OpenWeatherAPI</a:t>
+              <a:t>OpenWeather</a:t>
             </a:r>
             <a:r>
               <a:rPr lang="en-US" altLang="en-US" sz="3600" dirty="0">
                 <a:latin typeface="+mj-lt"/>
                 <a:cs typeface="Arial" panose="020B0604020202020204" pitchFamily="34" charset="0"/>
               </a:rPr>
-              <a:t> will be used to grab the data needed to return the results. </a:t>
+              <a:t> API was used to get real-time weather data for every city on the planet, which was passed to the program in JSON format.</a:t>
             </a:r>
           </a:p>
         </p:txBody>
@@ -4712,28 +4712,21 @@
           </a:p>
           <a:p>
             <a:pPr marL="571500" indent="-571500">
-              <a:buFontTx/>
-              <a:buChar char="-"/>
+              <a:buFont typeface="Arial" panose="020B0604020202020204" pitchFamily="34" charset="0"/>
+              <a:buChar char="•"/>
             </a:pPr>
-            <a:r>
-              <a:rPr lang="en-US" altLang="en-US" sz="3600">
-                <a:latin typeface="+mj-lt"/>
-                <a:cs typeface="Arial" panose="020B0604020202020204" pitchFamily="34" charset="0"/>
-              </a:rPr>
-              <a:t>Need </a:t>
-            </a:r>
             <a:r>
               <a:rPr lang="en-US" altLang="en-US" sz="3600" dirty="0">
                 <a:latin typeface="+mj-lt"/>
                 <a:cs typeface="Arial" panose="020B0604020202020204" pitchFamily="34" charset="0"/>
               </a:rPr>
-              <a:t>the ability to link to the webpage</a:t>
+              <a:t>Needs the ability to link data to the webpage</a:t>
             </a:r>
           </a:p>
           <a:p>
             <a:pPr marL="571500" indent="-571500">
-              <a:buFontTx/>
-              <a:buChar char="-"/>
+              <a:buFont typeface="Arial" panose="020B0604020202020204" pitchFamily="34" charset="0"/>
+              <a:buChar char="•"/>
             </a:pPr>
             <a:r>
               <a:rPr lang="en-US" altLang="en-US" sz="3600" dirty="0">
@@ -4745,8 +4738,8 @@
           </a:p>
           <a:p>
             <a:pPr marL="571500" indent="-571500">
-              <a:buFontTx/>
-              <a:buChar char="-"/>
+              <a:buFont typeface="Arial" panose="020B0604020202020204" pitchFamily="34" charset="0"/>
+              <a:buChar char="•"/>
             </a:pPr>
             <a:r>
               <a:rPr lang="en-US" altLang="en-US" sz="3600" dirty="0">
@@ -4758,8 +4751,8 @@
           </a:p>
           <a:p>
             <a:pPr marL="571500" indent="-571500">
-              <a:buFontTx/>
-              <a:buChar char="-"/>
+              <a:buFont typeface="Arial" panose="020B0604020202020204" pitchFamily="34" charset="0"/>
+              <a:buChar char="•"/>
             </a:pPr>
             <a:r>
               <a:rPr lang="en-US" altLang="en-US" sz="3600" dirty="0">
@@ -4771,8 +4764,8 @@
           </a:p>
           <a:p>
             <a:pPr marL="571500" indent="-571500">
-              <a:buFontTx/>
-              <a:buChar char="-"/>
+              <a:buFont typeface="Arial" panose="020B0604020202020204" pitchFamily="34" charset="0"/>
+              <a:buChar char="•"/>
             </a:pPr>
             <a:r>
               <a:rPr lang="en-US" altLang="en-US" sz="3600" dirty="0">
@@ -5216,7 +5209,7 @@
                 <a:latin typeface="+mj-lt"/>
                 <a:cs typeface="Arial" panose="020B0604020202020204" pitchFamily="34" charset="0"/>
               </a:rPr>
-              <a:t>     After several group meetings and collaborations, a working prototype has been developed. The Weather Warriors worked well together and found ways of creating a weather website that is unique. A short demonstration will be included in the video that will accompany this project. The video describes our collaboration and website functions.</a:t>
+              <a:t>     After several group meetings and collaborations, a working webpage that meets all of our requirements was developed. The Weather Warriors worked well together and created a web application that was both efficient and aesthetically pleasing. A short demonstration will be included in the video that will accompany this project. The video describes our collaboration and website functions.</a:t>
             </a:r>
           </a:p>
         </p:txBody>
@@ -5403,15 +5396,10 @@
             </a:r>
           </a:p>
           <a:p>
-            <a:r>
-              <a:rPr lang="en-US" altLang="en-US" sz="3600" dirty="0">
-                <a:latin typeface="+mj-lt"/>
-                <a:cs typeface="Arial" panose="020B0604020202020204" pitchFamily="34" charset="0"/>
-              </a:rPr>
-              <a:t>In addition to the current weather, a future enhancement would return a picture of the city selected. This will provide for a better experience for the user. </a:t>
-            </a:r>
-          </a:p>
-          <a:p>
+            <a:pPr marL="571500" indent="-571500">
+              <a:buFont typeface="Arial" panose="020B0604020202020204" pitchFamily="34" charset="0"/>
+              <a:buChar char="•"/>
+            </a:pPr>
             <a:r>
               <a:rPr lang="en-US" altLang="en-US" sz="3600" dirty="0">
                 <a:latin typeface="+mj-lt"/>
@@ -5421,6 +5409,10 @@
             </a:r>
           </a:p>
           <a:p>
+            <a:pPr marL="571500" indent="-571500">
+              <a:buFont typeface="Arial" panose="020B0604020202020204" pitchFamily="34" charset="0"/>
+              <a:buChar char="•"/>
+            </a:pPr>
             <a:r>
               <a:rPr lang="en-US" altLang="en-US" sz="3600" dirty="0">
                 <a:latin typeface="+mj-lt"/>
@@ -5430,6 +5422,10 @@
             </a:r>
           </a:p>
           <a:p>
+            <a:pPr marL="571500" indent="-571500">
+              <a:buFont typeface="Arial" panose="020B0604020202020204" pitchFamily="34" charset="0"/>
+              <a:buChar char="•"/>
+            </a:pPr>
             <a:r>
               <a:rPr lang="en-US" altLang="en-US" sz="3600" dirty="0">
                 <a:latin typeface="+mj-lt"/>
@@ -5439,6 +5435,10 @@
             </a:r>
           </a:p>
           <a:p>
+            <a:pPr marL="571500" indent="-571500">
+              <a:buFont typeface="Arial" panose="020B0604020202020204" pitchFamily="34" charset="0"/>
+              <a:buChar char="•"/>
+            </a:pPr>
             <a:r>
               <a:rPr lang="en-US" altLang="en-US" sz="3600" dirty="0">
                 <a:latin typeface="+mj-lt"/>
@@ -5448,6 +5448,10 @@
             </a:r>
           </a:p>
           <a:p>
+            <a:pPr marL="571500" indent="-571500">
+              <a:buFont typeface="Arial" panose="020B0604020202020204" pitchFamily="34" charset="0"/>
+              <a:buChar char="•"/>
+            </a:pPr>
             <a:r>
               <a:rPr lang="en-US" altLang="en-US" sz="3600" dirty="0">
                 <a:latin typeface="+mj-lt"/>
@@ -5509,7 +5513,7 @@
         </p:blipFill>
         <p:spPr>
           <a:xfrm>
-            <a:off x="12001500" y="7186821"/>
+            <a:off x="11675078" y="7186821"/>
             <a:ext cx="19888200" cy="10167765"/>
           </a:xfrm>
           <a:prstGeom prst="rect">
@@ -5539,7 +5543,7 @@
         </p:blipFill>
         <p:spPr>
           <a:xfrm>
-            <a:off x="12340127" y="17705749"/>
+            <a:off x="12745251" y="17541060"/>
             <a:ext cx="17754600" cy="14984052"/>
           </a:xfrm>
           <a:prstGeom prst="rect">

</xml_diff>